<commit_message>
Termine aktualisiert für 2018
</commit_message>
<xml_diff>
--- a/folien/Semester_04_Termin_03_Kapitel11.pptx
+++ b/folien/Semester_04_Termin_03_Kapitel11.pptx
@@ -201,10 +201,6 @@
     </p:ext>
   </p:extLst>
 </p:presentation>
-</file>
-
-<file path=ppt/revisionInfo.xml><?xml version="1.0" encoding="utf-8"?>
-<p1510:revInfo xmlns:a="http://schemas.openxmlformats.org/drawingml/2006/main" xmlns:r="http://schemas.openxmlformats.org/officeDocument/2006/relationships" xmlns:p1510="http://schemas.microsoft.com/office/powerpoint/2015/10/main"/>
 </file>
 
 <file path=ppt/notesMasters/notesMaster1.xml><?xml version="1.0" encoding="utf-8"?>
@@ -13231,7 +13227,7 @@
             </a:br>
             <a:r>
               <a:rPr lang="de-DE" altLang="de-DE" sz="2800" dirty="0"/>
-              <a:t>den 13.05.2017, 24 Uhr mit, wie Sie Ihre Gruppen</a:t>
+              <a:t>den 13.05.2018, 24 Uhr mit, wie Sie Ihre Gruppen</a:t>
             </a:r>
             <a:br>
               <a:rPr lang="de-DE" altLang="de-DE" sz="2800" dirty="0"/>
@@ -18686,7 +18682,7 @@
               <a:rPr lang="de-DE" altLang="de-DE" sz="2800" dirty="0">
                 <a:hlinkClick r:id="rId3"/>
               </a:rPr>
-              <a:t>https://github.com/nordakademie-einfuehrung-java/hausarbeit-w15c-</a:t>
+              <a:t>https://github.com/nordakademie-einfuehrung-java/hausarbeit-w16c-</a:t>
             </a:r>
             <a:r>
               <a:rPr lang="de-DE" altLang="de-DE" sz="2800" i="1" dirty="0">
@@ -21289,7 +21285,7 @@
             </a:pPr>
             <a:r>
               <a:rPr lang="de-DE" altLang="de-DE" sz="2800" dirty="0"/>
-              <a:t>Das Thema zur Hausarbeit wird Ihnen spätestens am 16.05.2017 um 0:00 Uhr per E-Mail an den Zenturien-Verteiler zugestellt</a:t>
+              <a:t>Das Thema zur Hausarbeit wird Ihnen spätestens am 17.05.2018 um 0:00 Uhr per E-Mail an den Zenturien-Verteiler zugestellt</a:t>
             </a:r>
           </a:p>
           <a:p>
@@ -21370,7 +21366,7 @@
             </a:pPr>
             <a:r>
               <a:rPr lang="de-DE" altLang="de-DE" sz="2800" dirty="0"/>
-              <a:t>Am Ende (!) der Vorlesung vom 16.05.2017 wird die Aufgabenstellung vom Dozenten kurz vorgestellt und es können allgemeine Verständnisfragen geklärt werden</a:t>
+              <a:t>Während der Vorlesung vom 24.05.2018 können Fragen zur Aufgabenstellung geklärt werden, die nicht bereits per E-Mail behandelt wurden</a:t>
             </a:r>
           </a:p>
           <a:p>
@@ -21670,7 +21666,60 @@
             </a:pPr>
             <a:r>
               <a:rPr lang="de-DE" altLang="de-DE" sz="2800" dirty="0"/>
-              <a:t>In der letzten Vorlesung am 20.06.2017 werden die Ergebnisse von jeder Gruppe kurz vorgestellt</a:t>
+              <a:t>Die Hausarbeit ist am 13.06.2018 um 23:59 Uhr per E-Mail abzugeben</a:t>
+            </a:r>
+          </a:p>
+          <a:p>
+            <a:pPr marL="269875" indent="-269875" eaLnBrk="1">
+              <a:spcAft>
+                <a:spcPct val="0"/>
+              </a:spcAft>
+              <a:buSzPct val="45000"/>
+              <a:buFont typeface="Wingdings" charset="2"/>
+              <a:buChar char=""/>
+              <a:tabLst>
+                <a:tab pos="723900" algn="l"/>
+                <a:tab pos="1447800" algn="l"/>
+                <a:tab pos="2171700" algn="l"/>
+                <a:tab pos="2895600" algn="l"/>
+                <a:tab pos="3619500" algn="l"/>
+                <a:tab pos="4343400" algn="l"/>
+                <a:tab pos="5067300" algn="l"/>
+                <a:tab pos="5791200" algn="l"/>
+                <a:tab pos="6515100" algn="l"/>
+                <a:tab pos="7239000" algn="l"/>
+                <a:tab pos="7962900" algn="l"/>
+                <a:tab pos="8686800" algn="l"/>
+              </a:tabLst>
+            </a:pPr>
+            <a:endParaRPr lang="de-DE" altLang="de-DE" sz="2800" dirty="0"/>
+          </a:p>
+          <a:p>
+            <a:pPr marL="269875" indent="-269875" eaLnBrk="1">
+              <a:spcAft>
+                <a:spcPct val="0"/>
+              </a:spcAft>
+              <a:buSzPct val="45000"/>
+              <a:buFont typeface="Wingdings" charset="2"/>
+              <a:buChar char=""/>
+              <a:tabLst>
+                <a:tab pos="723900" algn="l"/>
+                <a:tab pos="1447800" algn="l"/>
+                <a:tab pos="2171700" algn="l"/>
+                <a:tab pos="2895600" algn="l"/>
+                <a:tab pos="3619500" algn="l"/>
+                <a:tab pos="4343400" algn="l"/>
+                <a:tab pos="5067300" algn="l"/>
+                <a:tab pos="5791200" algn="l"/>
+                <a:tab pos="6515100" algn="l"/>
+                <a:tab pos="7239000" algn="l"/>
+                <a:tab pos="7962900" algn="l"/>
+                <a:tab pos="8686800" algn="l"/>
+              </a:tabLst>
+            </a:pPr>
+            <a:r>
+              <a:rPr lang="de-DE" altLang="de-DE" sz="2800" dirty="0"/>
+              <a:t>In der letzten Vorlesung am 14.06.2018 werden die Ergebnisse von jeder Gruppe kurz vorgestellt</a:t>
             </a:r>
           </a:p>
           <a:p>

</xml_diff>